<commit_message>
Updated presentation to include overview slide
</commit_message>
<xml_diff>
--- a/Presentation/Date Night.pptx
+++ b/Presentation/Date Night.pptx
@@ -12,7 +12,7 @@
   </p:handoutMasterIdLst>
   <p:sldIdLst>
     <p:sldId id="265" r:id="rId2"/>
-    <p:sldId id="328" r:id="rId3"/>
+    <p:sldId id="329" r:id="rId3"/>
     <p:sldId id="310" r:id="rId4"/>
     <p:sldId id="320" r:id="rId5"/>
     <p:sldId id="322" r:id="rId6"/>
@@ -4202,12 +4202,115 @@
           <a:chExt cx="0" cy="0"/>
         </a:xfrm>
       </p:grpSpPr>
+      <p:sp>
+        <p:nvSpPr>
+          <p:cNvPr id="2" name="Title 1">
+            <a:extLst>
+              <a:ext uri="{FF2B5EF4-FFF2-40B4-BE49-F238E27FC236}">
+                <a16:creationId xmlns:a16="http://schemas.microsoft.com/office/drawing/2014/main" id="{C48AEDF8-6134-4199-A011-84C592D1BEA2}"/>
+              </a:ext>
+            </a:extLst>
+          </p:cNvPr>
+          <p:cNvSpPr>
+            <a:spLocks noGrp="1"/>
+          </p:cNvSpPr>
+          <p:nvPr>
+            <p:ph type="title"/>
+          </p:nvPr>
+        </p:nvSpPr>
+        <p:spPr>
+          <a:xfrm>
+            <a:off x="1522413" y="381000"/>
+            <a:ext cx="9144001" cy="762000"/>
+          </a:xfrm>
+        </p:spPr>
+        <p:txBody>
+          <a:bodyPr/>
+          <a:lstStyle/>
+          <a:p>
+            <a:pPr algn="ctr"/>
+            <a:r>
+              <a:rPr lang="en-US" dirty="0"/>
+              <a:t>Overview</a:t>
+            </a:r>
+          </a:p>
+        </p:txBody>
+      </p:sp>
+      <p:sp>
+        <p:nvSpPr>
+          <p:cNvPr id="3" name="Content Placeholder 2">
+            <a:extLst>
+              <a:ext uri="{FF2B5EF4-FFF2-40B4-BE49-F238E27FC236}">
+                <a16:creationId xmlns:a16="http://schemas.microsoft.com/office/drawing/2014/main" id="{3B0C513B-81D6-4963-91E5-8C0ECC2FB04D}"/>
+              </a:ext>
+            </a:extLst>
+          </p:cNvPr>
+          <p:cNvSpPr>
+            <a:spLocks noGrp="1"/>
+          </p:cNvSpPr>
+          <p:nvPr>
+            <p:ph idx="1"/>
+          </p:nvPr>
+        </p:nvSpPr>
+        <p:spPr>
+          <a:xfrm>
+            <a:off x="1141412" y="1713612"/>
+            <a:ext cx="9134391" cy="4114801"/>
+          </a:xfrm>
+        </p:spPr>
+        <p:txBody>
+          <a:bodyPr/>
+          <a:lstStyle/>
+          <a:p>
+            <a:r>
+              <a:rPr lang="en-US" dirty="0"/>
+              <a:t>Introduction</a:t>
+            </a:r>
+          </a:p>
+          <a:p>
+            <a:r>
+              <a:rPr lang="en-US" dirty="0"/>
+              <a:t>Concept</a:t>
+            </a:r>
+          </a:p>
+          <a:p>
+            <a:r>
+              <a:rPr lang="en-US" dirty="0"/>
+              <a:t>Process</a:t>
+            </a:r>
+          </a:p>
+          <a:p>
+            <a:r>
+              <a:rPr lang="en-US" dirty="0"/>
+              <a:t>Demo</a:t>
+            </a:r>
+          </a:p>
+          <a:p>
+            <a:r>
+              <a:rPr lang="en-US" dirty="0"/>
+              <a:t>Future Development</a:t>
+            </a:r>
+          </a:p>
+          <a:p>
+            <a:r>
+              <a:rPr lang="en-US" dirty="0"/>
+              <a:t>Links</a:t>
+            </a:r>
+          </a:p>
+          <a:p>
+            <a:r>
+              <a:rPr lang="en-US" dirty="0"/>
+              <a:t>Questions</a:t>
+            </a:r>
+          </a:p>
+        </p:txBody>
+      </p:sp>
       <p:pic>
         <p:nvPicPr>
-          <p:cNvPr id="7" name="Picture 6">
+          <p:cNvPr id="4" name="Picture 3">
             <a:extLst>
               <a:ext uri="{FF2B5EF4-FFF2-40B4-BE49-F238E27FC236}">
-                <a16:creationId xmlns:a16="http://schemas.microsoft.com/office/drawing/2014/main" id="{68F0FB81-666F-4837-96FE-B42C2B085CBB}"/>
+                <a16:creationId xmlns:a16="http://schemas.microsoft.com/office/drawing/2014/main" id="{6A6819D4-2CFC-4B54-8712-F1422777EC2A}"/>
               </a:ext>
             </a:extLst>
           </p:cNvPr>
@@ -4229,8 +4332,8 @@
         </p:blipFill>
         <p:spPr>
           <a:xfrm>
-            <a:off x="2894012" y="154172"/>
-            <a:ext cx="6400800" cy="6549656"/>
+            <a:off x="6170612" y="1371599"/>
+            <a:ext cx="4689765" cy="4798829"/>
           </a:xfrm>
           <a:prstGeom prst="rect">
             <a:avLst/>
@@ -4240,7 +4343,7 @@
     </p:spTree>
     <p:extLst>
       <p:ext uri="{BB962C8B-B14F-4D97-AF65-F5344CB8AC3E}">
-        <p14:creationId xmlns:p14="http://schemas.microsoft.com/office/powerpoint/2010/main" val="3722817698"/>
+        <p14:creationId xmlns:p14="http://schemas.microsoft.com/office/powerpoint/2010/main" val="560329273"/>
       </p:ext>
     </p:extLst>
   </p:cSld>

</xml_diff>

<commit_message>
Uploaded updated copy with edits from proofreading
</commit_message>
<xml_diff>
--- a/Presentation/Date Night.pptx
+++ b/Presentation/Date Night.pptx
@@ -4433,7 +4433,7 @@
             </a:pPr>
             <a:r>
               <a:rPr lang="en-US" dirty="0"/>
-              <a:t>Links are provided to further explore any of items you see to get further details.</a:t>
+              <a:t>Links are provided to further explore any of the items you see to get further details.</a:t>
             </a:r>
           </a:p>
         </p:txBody>
@@ -4536,7 +4536,7 @@
             <a:pPr lvl="1"/>
             <a:r>
               <a:rPr lang="en-US" dirty="0"/>
-              <a:t>Date Night is a simple web tool that is a personal assistant that uses external APIs to collect information on weather, events, activities and restaurants and presents on a single page.</a:t>
+              <a:t>Date Night is a simple web tool that is a personal assistant that uses external APIs to collect information on weather, events, activities and restaurants and presents it on a single page.</a:t>
             </a:r>
           </a:p>
           <a:p>
@@ -4562,7 +4562,7 @@
             <a:pPr lvl="1"/>
             <a:r>
               <a:rPr lang="en-US" dirty="0"/>
-              <a:t>A user enters a US location and is provided with a summary of weather, restaurants, activities and events.  </a:t>
+              <a:t>A user enters a location and is provided with a summary of weather, restaurants, activities and events in the requested city.  </a:t>
             </a:r>
           </a:p>
           <a:p>
@@ -4664,7 +4664,7 @@
           <a:p>
             <a:r>
               <a:rPr lang="en-US" dirty="0"/>
-              <a:t>Challenges</a:t>
+              <a:t>Technology</a:t>
             </a:r>
           </a:p>
           <a:p>

</xml_diff>